<commit_message>
Updated Web scraping method PowerPoint file
</commit_message>
<xml_diff>
--- a/Web scraping method.pptx
+++ b/Web scraping method.pptx
@@ -2311,7 +2311,7 @@
           <a:p>
             <a:fld id="{28014D0E-799D-4692-8F1B-D8A4F40D3790}" type="datetimeFigureOut">
               <a:rPr lang="ko-KR" altLang="en-US" smtClean="0"/>
-              <a:t>2024-10-06</a:t>
+              <a:t>2024-10-08</a:t>
             </a:fld>
             <a:endParaRPr lang="ko-KR" altLang="en-US"/>
           </a:p>
@@ -2509,7 +2509,7 @@
           <a:p>
             <a:fld id="{28014D0E-799D-4692-8F1B-D8A4F40D3790}" type="datetimeFigureOut">
               <a:rPr lang="ko-KR" altLang="en-US" smtClean="0"/>
-              <a:t>2024-10-06</a:t>
+              <a:t>2024-10-08</a:t>
             </a:fld>
             <a:endParaRPr lang="ko-KR" altLang="en-US"/>
           </a:p>
@@ -2717,7 +2717,7 @@
           <a:p>
             <a:fld id="{28014D0E-799D-4692-8F1B-D8A4F40D3790}" type="datetimeFigureOut">
               <a:rPr lang="ko-KR" altLang="en-US" smtClean="0"/>
-              <a:t>2024-10-06</a:t>
+              <a:t>2024-10-08</a:t>
             </a:fld>
             <a:endParaRPr lang="ko-KR" altLang="en-US"/>
           </a:p>
@@ -2915,7 +2915,7 @@
           <a:p>
             <a:fld id="{28014D0E-799D-4692-8F1B-D8A4F40D3790}" type="datetimeFigureOut">
               <a:rPr lang="ko-KR" altLang="en-US" smtClean="0"/>
-              <a:t>2024-10-06</a:t>
+              <a:t>2024-10-08</a:t>
             </a:fld>
             <a:endParaRPr lang="ko-KR" altLang="en-US"/>
           </a:p>
@@ -3190,7 +3190,7 @@
           <a:p>
             <a:fld id="{28014D0E-799D-4692-8F1B-D8A4F40D3790}" type="datetimeFigureOut">
               <a:rPr lang="ko-KR" altLang="en-US" smtClean="0"/>
-              <a:t>2024-10-06</a:t>
+              <a:t>2024-10-08</a:t>
             </a:fld>
             <a:endParaRPr lang="ko-KR" altLang="en-US"/>
           </a:p>
@@ -3455,7 +3455,7 @@
           <a:p>
             <a:fld id="{28014D0E-799D-4692-8F1B-D8A4F40D3790}" type="datetimeFigureOut">
               <a:rPr lang="ko-KR" altLang="en-US" smtClean="0"/>
-              <a:t>2024-10-06</a:t>
+              <a:t>2024-10-08</a:t>
             </a:fld>
             <a:endParaRPr lang="ko-KR" altLang="en-US"/>
           </a:p>
@@ -3867,7 +3867,7 @@
           <a:p>
             <a:fld id="{28014D0E-799D-4692-8F1B-D8A4F40D3790}" type="datetimeFigureOut">
               <a:rPr lang="ko-KR" altLang="en-US" smtClean="0"/>
-              <a:t>2024-10-06</a:t>
+              <a:t>2024-10-08</a:t>
             </a:fld>
             <a:endParaRPr lang="ko-KR" altLang="en-US"/>
           </a:p>
@@ -4008,7 +4008,7 @@
           <a:p>
             <a:fld id="{28014D0E-799D-4692-8F1B-D8A4F40D3790}" type="datetimeFigureOut">
               <a:rPr lang="ko-KR" altLang="en-US" smtClean="0"/>
-              <a:t>2024-10-06</a:t>
+              <a:t>2024-10-08</a:t>
             </a:fld>
             <a:endParaRPr lang="ko-KR" altLang="en-US"/>
           </a:p>
@@ -4121,7 +4121,7 @@
           <a:p>
             <a:fld id="{28014D0E-799D-4692-8F1B-D8A4F40D3790}" type="datetimeFigureOut">
               <a:rPr lang="ko-KR" altLang="en-US" smtClean="0"/>
-              <a:t>2024-10-06</a:t>
+              <a:t>2024-10-08</a:t>
             </a:fld>
             <a:endParaRPr lang="ko-KR" altLang="en-US"/>
           </a:p>
@@ -4432,7 +4432,7 @@
           <a:p>
             <a:fld id="{28014D0E-799D-4692-8F1B-D8A4F40D3790}" type="datetimeFigureOut">
               <a:rPr lang="ko-KR" altLang="en-US" smtClean="0"/>
-              <a:t>2024-10-06</a:t>
+              <a:t>2024-10-08</a:t>
             </a:fld>
             <a:endParaRPr lang="ko-KR" altLang="en-US"/>
           </a:p>
@@ -4720,7 +4720,7 @@
           <a:p>
             <a:fld id="{28014D0E-799D-4692-8F1B-D8A4F40D3790}" type="datetimeFigureOut">
               <a:rPr lang="ko-KR" altLang="en-US" smtClean="0"/>
-              <a:t>2024-10-06</a:t>
+              <a:t>2024-10-08</a:t>
             </a:fld>
             <a:endParaRPr lang="ko-KR" altLang="en-US"/>
           </a:p>
@@ -4961,7 +4961,7 @@
           <a:p>
             <a:fld id="{28014D0E-799D-4692-8F1B-D8A4F40D3790}" type="datetimeFigureOut">
               <a:rPr lang="ko-KR" altLang="en-US" smtClean="0"/>
-              <a:t>2024-10-06</a:t>
+              <a:t>2024-10-08</a:t>
             </a:fld>
             <a:endParaRPr lang="ko-KR" altLang="en-US"/>
           </a:p>
@@ -5406,7 +5406,7 @@
                 <a:latin typeface="Cambria" panose="02040503050406030204" pitchFamily="18" charset="0"/>
                 <a:ea typeface="Cambria" panose="02040503050406030204" pitchFamily="18" charset="0"/>
               </a:rPr>
-              <a:t>Web Scarping Method </a:t>
+              <a:t>Web Scraping Method </a:t>
             </a:r>
             <a:br>
               <a:rPr lang="en-US" altLang="ko-KR" dirty="0">
@@ -16258,7 +16258,7 @@
                 </a:solidFill>
                 <a:latin typeface="Consolas" panose="020B0609020204030204" pitchFamily="49" charset="0"/>
               </a:rPr>
-              <a:t>Therefore, ‘Response’ object is a JASON-Formatted data , converted into a </a:t>
+              <a:t>Therefore, ‘Response’ object is a JSON-Formatted data , converted into a </a:t>
             </a:r>
           </a:p>
           <a:p>

</xml_diff>